<commit_message>
This is python file
</commit_message>
<xml_diff>
--- a/ISD Transformation.pptx
+++ b/ISD Transformation.pptx
@@ -8833,22 +8833,23 @@
             <a:pPr lvl="1"/>
             <a:r>
               <a:rPr lang="en-US" b="1" dirty="0"/>
-              <a:t>F name L name</a:t>
+              <a:t>Suresh Babu</a:t>
             </a:r>
           </a:p>
           <a:p>
             <a:pPr lvl="1"/>
             <a:r>
               <a:rPr lang="en-US" dirty="0"/>
-              <a:t>Title</a:t>
+              <a:t>Architect</a:t>
             </a:r>
           </a:p>
           <a:p>
             <a:pPr lvl="1"/>
             <a:r>
-              <a:rPr lang="en-US" dirty="0"/>
-              <a:t>Address</a:t>
-            </a:r>
+              <a:rPr lang="en-US"/>
+              <a:t>Sap America</a:t>
+            </a:r>
+            <a:endParaRPr lang="en-US" dirty="0"/>
           </a:p>
           <a:p>
             <a:pPr lvl="1"/>
@@ -12139,29 +12140,6 @@
 </file>
 
 <file path=customXml/item1.xml><?xml version="1.0" encoding="utf-8"?>
-<?mso-contentType ?>
-<FormTemplates xmlns="http://schemas.microsoft.com/sharepoint/v3/contenttype/forms">
-  <Display>DocumentLibraryForm</Display>
-  <Edit>DocumentLibraryForm</Edit>
-  <New>DocumentLibraryForm</New>
-</FormTemplates>
-</file>
-
-<file path=customXml/item2.xml><?xml version="1.0" encoding="utf-8"?>
-<p:properties xmlns:p="http://schemas.microsoft.com/office/2006/metadata/properties" xmlns:xsi="http://www.w3.org/2001/XMLSchema-instance" xmlns:pc="http://schemas.microsoft.com/office/infopath/2007/PartnerControls">
-  <documentManagement>
-    <ResponsibleContact xmlns="47fc58d8-9f4b-4bc8-b278-c3cb6f298023">
-      <UserInfo>
-        <DisplayName/>
-        <AccountId xsi:nil="true"/>
-        <AccountType/>
-      </UserInfo>
-    </ResponsibleContact>
-  </documentManagement>
-</p:properties>
-</file>
-
-<file path=customXml/item3.xml><?xml version="1.0" encoding="utf-8"?>
 <ct:contentTypeSchema xmlns:ct="http://schemas.microsoft.com/office/2006/metadata/contentType" xmlns:ma="http://schemas.microsoft.com/office/2006/metadata/properties/metaAttributes" ct:_="" ma:_="" ma:contentTypeName="Dokument" ma:contentTypeID="0x010100615F0F9DCBF1E94796646FCF98A7C072" ma:contentTypeVersion="13" ma:contentTypeDescription="Ein neues Dokument erstellen." ma:contentTypeScope="" ma:versionID="35c4870f76107f1824caf51e384b5645">
   <xsd:schema xmlns:xsd="http://www.w3.org/2001/XMLSchema" xmlns:xs="http://www.w3.org/2001/XMLSchema" xmlns:p="http://schemas.microsoft.com/office/2006/metadata/properties" xmlns:ns2="0e00d59e-b0d2-4e67-be34-67e465b0fbed" xmlns:ns3="47fc58d8-9f4b-4bc8-b278-c3cb6f298023" targetNamespace="http://schemas.microsoft.com/office/2006/metadata/properties" ma:root="true" ma:fieldsID="9e6c4fb431539cf6566f50e157bdb217" ns2:_="" ns3:_="">
     <xsd:import namespace="0e00d59e-b0d2-4e67-be34-67e465b0fbed"/>
@@ -12398,25 +12376,30 @@
 </ct:contentTypeSchema>
 </file>
 
-<file path=customXml/itemProps1.xml><?xml version="1.0" encoding="utf-8"?>
-<ds:datastoreItem xmlns:ds="http://schemas.openxmlformats.org/officeDocument/2006/customXml" ds:itemID="{398FD485-E434-4109-8170-8E0CFCDC1783}">
-  <ds:schemaRefs>
-    <ds:schemaRef ds:uri="http://schemas.microsoft.com/sharepoint/v3/contenttype/forms"/>
-  </ds:schemaRefs>
-</ds:datastoreItem>
+<file path=customXml/item2.xml><?xml version="1.0" encoding="utf-8"?>
+<p:properties xmlns:p="http://schemas.microsoft.com/office/2006/metadata/properties" xmlns:xsi="http://www.w3.org/2001/XMLSchema-instance" xmlns:pc="http://schemas.microsoft.com/office/infopath/2007/PartnerControls">
+  <documentManagement>
+    <ResponsibleContact xmlns="47fc58d8-9f4b-4bc8-b278-c3cb6f298023">
+      <UserInfo>
+        <DisplayName/>
+        <AccountId xsi:nil="true"/>
+        <AccountType/>
+      </UserInfo>
+    </ResponsibleContact>
+  </documentManagement>
+</p:properties>
 </file>
 
-<file path=customXml/itemProps2.xml><?xml version="1.0" encoding="utf-8"?>
-<ds:datastoreItem xmlns:ds="http://schemas.openxmlformats.org/officeDocument/2006/customXml" ds:itemID="{85C1D00C-D380-4A8A-881E-03688FCC3109}">
-  <ds:schemaRefs>
-    <ds:schemaRef ds:uri="http://schemas.microsoft.com/office/2006/metadata/properties"/>
-    <ds:schemaRef ds:uri="http://schemas.microsoft.com/office/infopath/2007/PartnerControls"/>
-    <ds:schemaRef ds:uri="47fc58d8-9f4b-4bc8-b278-c3cb6f298023"/>
-  </ds:schemaRefs>
-</ds:datastoreItem>
+<file path=customXml/item3.xml><?xml version="1.0" encoding="utf-8"?>
+<?mso-contentType ?>
+<FormTemplates xmlns="http://schemas.microsoft.com/sharepoint/v3/contenttype/forms">
+  <Display>DocumentLibraryForm</Display>
+  <Edit>DocumentLibraryForm</Edit>
+  <New>DocumentLibraryForm</New>
+</FormTemplates>
 </file>
 
-<file path=customXml/itemProps3.xml><?xml version="1.0" encoding="utf-8"?>
+<file path=customXml/itemProps1.xml><?xml version="1.0" encoding="utf-8"?>
 <ds:datastoreItem xmlns:ds="http://schemas.openxmlformats.org/officeDocument/2006/customXml" ds:itemID="{59D2F0B6-B288-4221-91F6-0FBEB29FBBCC}">
   <ds:schemaRefs>
     <ds:schemaRef ds:uri="http://schemas.microsoft.com/office/2006/metadata/contentType"/>
@@ -12433,4 +12416,22 @@
     <ds:schemaRef ds:uri="http://schemas.microsoft.com/internal/obd"/>
   </ds:schemaRefs>
 </ds:datastoreItem>
+</file>
+
+<file path=customXml/itemProps2.xml><?xml version="1.0" encoding="utf-8"?>
+<ds:datastoreItem xmlns:ds="http://schemas.openxmlformats.org/officeDocument/2006/customXml" ds:itemID="{85C1D00C-D380-4A8A-881E-03688FCC3109}">
+  <ds:schemaRefs>
+    <ds:schemaRef ds:uri="http://schemas.microsoft.com/office/2006/metadata/properties"/>
+    <ds:schemaRef ds:uri="http://schemas.microsoft.com/office/infopath/2007/PartnerControls"/>
+    <ds:schemaRef ds:uri="47fc58d8-9f4b-4bc8-b278-c3cb6f298023"/>
+  </ds:schemaRefs>
+</ds:datastoreItem>
+</file>
+
+<file path=customXml/itemProps3.xml><?xml version="1.0" encoding="utf-8"?>
+<ds:datastoreItem xmlns:ds="http://schemas.openxmlformats.org/officeDocument/2006/customXml" ds:itemID="{398FD485-E434-4109-8170-8E0CFCDC1783}">
+  <ds:schemaRefs>
+    <ds:schemaRef ds:uri="http://schemas.microsoft.com/sharepoint/v3/contenttype/forms"/>
+  </ds:schemaRefs>
+</ds:datastoreItem>
 </file>
</xml_diff>